<commit_message>
Save certificates to a local directory
</commit_message>
<xml_diff>
--- a/output.pptx
+++ b/output.pptx
@@ -3269,7 +3269,7 @@
                 <a:latin typeface="Times New Roman"/>
                 <a:ea typeface="Times New Roman"/>
               </a:rPr>
-              <a:t>Private Fulcrum</a:t>
+              <a:t>Private Ryan</a:t>
             </a:r>
             <a:endParaRPr b="0" lang="en-US" sz="3600" spc="-1" strike="noStrike">
               <a:solidFill>
@@ -3565,7 +3565,7 @@
                 <a:latin typeface="Times New Roman"/>
                 <a:ea typeface="Times New Roman"/>
               </a:rPr>
-              <a:t>Private Fulcrum</a:t>
+              <a:t>Private Ryan</a:t>
             </a:r>
             <a:endParaRPr b="0" lang="en-US" sz="3200" spc="-1" strike="noStrike">
               <a:solidFill>
@@ -3642,7 +3642,7 @@
                 <a:latin typeface="Times New Roman"/>
                 <a:ea typeface="Times New Roman"/>
               </a:rPr>
-              <a:t>with effect 8 July 2023</a:t>
+              <a:t>with effect 14 July 2023</a:t>
             </a:r>
             <a:endParaRPr b="0" lang="en-US" sz="2000" spc="-1" strike="noStrike">
               <a:solidFill>
@@ -3699,7 +3699,7 @@
                 <a:latin typeface="Times New Roman"/>
                 <a:ea typeface="Times New Roman"/>
               </a:rPr>
-              <a:t>Private Fulcrum </a:t>
+              <a:t>Private Ryan </a:t>
             </a:r>
             <a:r>
               <a:rPr b="0" lang="en-AU" sz="2000" spc="-1" strike="noStrike">
@@ -3969,7 +3969,7 @@
                 <a:latin typeface="Times New Roman"/>
                 <a:ea typeface="Times New Roman"/>
               </a:rPr>
-              <a:t>Private Fulcrum</a:t>
+              <a:t>Private Ryan</a:t>
             </a:r>
             <a:endParaRPr b="0" lang="en-US" sz="3600" spc="-1" strike="noStrike">
               <a:solidFill>
@@ -4265,7 +4265,7 @@
                 <a:latin typeface="Times New Roman"/>
                 <a:ea typeface="Times New Roman"/>
               </a:rPr>
-              <a:t>Private Fulcrum</a:t>
+              <a:t>Private Ryan</a:t>
             </a:r>
             <a:endParaRPr b="0" lang="en-US" sz="3200" spc="-1" strike="noStrike">
               <a:solidFill>
@@ -4355,7 +4355,7 @@
                 <a:latin typeface="Times New Roman"/>
                 <a:ea typeface="Times New Roman"/>
               </a:rPr>
-              <a:t>8 July 2023.</a:t>
+              <a:t>14 July 2023.</a:t>
             </a:r>
             <a:endParaRPr b="0" lang="en-US" sz="2000" spc="-1" strike="noStrike">
               <a:solidFill>
@@ -4412,7 +4412,7 @@
                 <a:latin typeface="Times New Roman"/>
                 <a:ea typeface="Times New Roman"/>
               </a:rPr>
-              <a:t>Private Fulcrum </a:t>
+              <a:t>Private Ryan </a:t>
             </a:r>
             <a:r>
               <a:rPr b="0" lang="en-AU" sz="2000" spc="-1" strike="noStrike">
@@ -4695,7 +4695,7 @@
                 <a:latin typeface="Times New Roman"/>
                 <a:ea typeface="Times New Roman"/>
               </a:rPr>
-              <a:t>Private Fulcrum</a:t>
+              <a:t>Private Ryan</a:t>
             </a:r>
             <a:endParaRPr b="0" lang="en-US" sz="3600" spc="-1" strike="noStrike">
               <a:solidFill>
@@ -4991,7 +4991,7 @@
                 <a:latin typeface="Times New Roman"/>
                 <a:ea typeface="Times New Roman"/>
               </a:rPr>
-              <a:t>Private Fulcrum </a:t>
+              <a:t>Private Ryan </a:t>
             </a:r>
             <a:endParaRPr b="0" lang="en-US" sz="3200" spc="-1" strike="noStrike">
               <a:solidFill>
@@ -5068,7 +5068,7 @@
                 <a:latin typeface="Times New Roman"/>
                 <a:ea typeface="Times New Roman"/>
               </a:rPr>
-              <a:t>with effect 8 July 2023.</a:t>
+              <a:t>with effect 14 July 2023.</a:t>
             </a:r>
             <a:endParaRPr b="0" lang="en-US" sz="2000" spc="-1" strike="noStrike">
               <a:solidFill>
@@ -5125,7 +5125,7 @@
                 <a:latin typeface="Times New Roman"/>
                 <a:ea typeface="Times New Roman"/>
               </a:rPr>
-              <a:t>Private Fulcrum </a:t>
+              <a:t>Private Ryan </a:t>
             </a:r>
             <a:r>
               <a:rPr b="0" lang="en-AU" sz="2000" spc="-1" strike="noStrike">
@@ -5408,7 +5408,7 @@
                 <a:latin typeface="Times New Roman"/>
                 <a:ea typeface="Times New Roman"/>
               </a:rPr>
-              <a:t>Private Fulcrum</a:t>
+              <a:t>Private Ryan</a:t>
             </a:r>
             <a:endParaRPr b="0" lang="en-US" sz="3600" spc="-1" strike="noStrike">
               <a:solidFill>
@@ -5704,7 +5704,7 @@
                 <a:latin typeface="Times New Roman"/>
                 <a:ea typeface="Times New Roman"/>
               </a:rPr>
-              <a:t>Private Fulcrum</a:t>
+              <a:t>Private Ryan</a:t>
             </a:r>
             <a:endParaRPr b="0" lang="en-US" sz="3200" spc="-1" strike="noStrike">
               <a:solidFill>
@@ -5791,7 +5791,7 @@
                 <a:latin typeface="Times New Roman"/>
                 <a:ea typeface="Times New Roman"/>
               </a:rPr>
-              <a:t>8 July 2023.</a:t>
+              <a:t>14 July 2023.</a:t>
             </a:r>
             <a:r>
               <a:rPr b="0" lang="en-AU" sz="2000" spc="-1" strike="noStrike">
@@ -5858,7 +5858,7 @@
                 <a:latin typeface="Times New Roman"/>
                 <a:ea typeface="Times New Roman"/>
               </a:rPr>
-              <a:t>Private Fulcrum </a:t>
+              <a:t>Private Ryan </a:t>
             </a:r>
             <a:r>
               <a:rPr b="0" lang="en-AU" sz="2000" spc="-1" strike="noStrike">
@@ -6128,7 +6128,7 @@
                 <a:latin typeface="Times New Roman"/>
                 <a:ea typeface="Times New Roman"/>
               </a:rPr>
-              <a:t>Private Fulcrum</a:t>
+              <a:t>Private Ryan</a:t>
             </a:r>
             <a:endParaRPr b="0" lang="en-US" sz="3600" spc="-1" strike="noStrike">
               <a:solidFill>
@@ -6424,7 +6424,7 @@
                 <a:latin typeface="Times New Roman"/>
                 <a:ea typeface="Times New Roman"/>
               </a:rPr>
-              <a:t>Private Fulcrum</a:t>
+              <a:t>Private Ryan</a:t>
             </a:r>
             <a:endParaRPr b="0" lang="en-US" sz="3200" spc="-1" strike="noStrike">
               <a:solidFill>
@@ -6514,7 +6514,7 @@
                 <a:latin typeface="Times New Roman"/>
                 <a:ea typeface="Times New Roman"/>
               </a:rPr>
-              <a:t>8 July 2023.</a:t>
+              <a:t>14 July 2023.</a:t>
             </a:r>
             <a:endParaRPr b="0" lang="en-US" sz="2000" spc="-1" strike="noStrike">
               <a:solidFill>
@@ -6571,7 +6571,7 @@
                 <a:latin typeface="Times New Roman"/>
                 <a:ea typeface="Times New Roman"/>
               </a:rPr>
-              <a:t>Private Fulcrum </a:t>
+              <a:t>Private Ryan </a:t>
             </a:r>
             <a:r>
               <a:rPr b="0" lang="en-AU" sz="2000" spc="-1" strike="noStrike">
@@ -6854,7 +6854,7 @@
                 <a:latin typeface="Times New Roman"/>
                 <a:ea typeface="Times New Roman"/>
               </a:rPr>
-              <a:t>Private Fulcrum</a:t>
+              <a:t>Private Ryan</a:t>
             </a:r>
             <a:endParaRPr b="0" lang="en-US" sz="3600" spc="-1" strike="noStrike">
               <a:solidFill>
@@ -7150,7 +7150,7 @@
                 <a:latin typeface="Times New Roman"/>
                 <a:ea typeface="Times New Roman"/>
               </a:rPr>
-              <a:t>Private Fulcrum</a:t>
+              <a:t>Private Ryan</a:t>
             </a:r>
             <a:br>
               <a:rPr sz="3200"/>
@@ -7243,7 +7243,7 @@
                 <a:latin typeface="Times New Roman"/>
                 <a:ea typeface="Times New Roman"/>
               </a:rPr>
-              <a:t>8 July 2023.</a:t>
+              <a:t>14 July 2023.</a:t>
             </a:r>
             <a:endParaRPr b="0" lang="en-US" sz="2000" spc="-1" strike="noStrike">
               <a:solidFill>
@@ -7300,7 +7300,7 @@
                 <a:latin typeface="Times New Roman"/>
                 <a:ea typeface="Times New Roman"/>
               </a:rPr>
-              <a:t>Private Fulcrum</a:t>
+              <a:t>Private Ryan</a:t>
             </a:r>
             <a:r>
               <a:rPr b="0" i="1" lang="en-AU" sz="2000" spc="-1" strike="noStrike">
@@ -7580,7 +7580,7 @@
                 <a:latin typeface="Times New Roman"/>
                 <a:ea typeface="Times New Roman"/>
               </a:rPr>
-              <a:t>Private Fulcrum</a:t>
+              <a:t>Private Ryan</a:t>
             </a:r>
             <a:endParaRPr b="0" lang="en-US" sz="3600" spc="-1" strike="noStrike">
               <a:solidFill>
@@ -7876,7 +7876,7 @@
                 <a:latin typeface="Times New Roman"/>
                 <a:ea typeface="Times New Roman"/>
               </a:rPr>
-              <a:t>Private Fulcrum</a:t>
+              <a:t>Private Ryan</a:t>
             </a:r>
             <a:endParaRPr b="0" lang="en-US" sz="3200" spc="-1" strike="noStrike">
               <a:solidFill>
@@ -7933,7 +7933,7 @@
                 <a:latin typeface="Times New Roman"/>
                 <a:ea typeface="Times New Roman"/>
               </a:rPr>
-              <a:t>entry to the unit with effect 8 July 2023.</a:t>
+              <a:t>entry to the unit with effect 14 July 2023.</a:t>
             </a:r>
             <a:endParaRPr b="0" lang="en-US" sz="2000" spc="-1" strike="noStrike">
               <a:solidFill>
@@ -7990,7 +7990,7 @@
                 <a:latin typeface="Times New Roman"/>
                 <a:ea typeface="Times New Roman"/>
               </a:rPr>
-              <a:t>Private Fulcrum</a:t>
+              <a:t>Private Ryan</a:t>
             </a:r>
             <a:r>
               <a:rPr b="0" lang="en-AU" sz="2000" spc="-1" strike="noStrike">
@@ -8260,7 +8260,7 @@
                 <a:latin typeface="Times New Roman"/>
                 <a:ea typeface="Times New Roman"/>
               </a:rPr>
-              <a:t>Private Fulcrum</a:t>
+              <a:t>Private Ryan</a:t>
             </a:r>
             <a:endParaRPr b="0" lang="en-US" sz="3600" spc="-1" strike="noStrike">
               <a:solidFill>
@@ -8579,7 +8579,7 @@
                 <a:latin typeface="Times New Roman"/>
                 <a:ea typeface="Times New Roman"/>
               </a:rPr>
-              <a:t>Private Fulcrum</a:t>
+              <a:t>Private Ryan</a:t>
             </a:r>
             <a:endParaRPr b="0" lang="en-US" sz="3200" spc="-1" strike="noStrike">
               <a:solidFill>
@@ -8656,7 +8656,7 @@
                 <a:latin typeface="Times New Roman"/>
                 <a:ea typeface="Times New Roman"/>
               </a:rPr>
-              <a:t>with effect 8 July 2023</a:t>
+              <a:t>with effect 14 July 2023</a:t>
             </a:r>
             <a:endParaRPr b="0" lang="en-US" sz="2000" spc="-1" strike="noStrike">
               <a:solidFill>
@@ -8713,7 +8713,7 @@
                 <a:latin typeface="Times New Roman"/>
                 <a:ea typeface="Times New Roman"/>
               </a:rPr>
-              <a:t>Private Fulcrum </a:t>
+              <a:t>Private Ryan </a:t>
             </a:r>
             <a:r>
               <a:rPr b="0" lang="en-AU" sz="2000" spc="-1" strike="noStrike">
@@ -8996,7 +8996,7 @@
                 <a:latin typeface="Times New Roman"/>
                 <a:ea typeface="Times New Roman"/>
               </a:rPr>
-              <a:t>Private Fulcrum</a:t>
+              <a:t>Private Ryan</a:t>
             </a:r>
             <a:endParaRPr b="0" lang="en-US" sz="3600" spc="-1" strike="noStrike">
               <a:solidFill>
@@ -9315,7 +9315,7 @@
                 <a:latin typeface="Times New Roman"/>
                 <a:ea typeface="Times New Roman"/>
               </a:rPr>
-              <a:t>Private Fulcrum</a:t>
+              <a:t>Private Ryan</a:t>
             </a:r>
             <a:endParaRPr b="0" lang="en-US" sz="3200" spc="-1" strike="noStrike">
               <a:solidFill>
@@ -9392,7 +9392,7 @@
                 <a:latin typeface="Times New Roman"/>
                 <a:ea typeface="Times New Roman"/>
               </a:rPr>
-              <a:t>with effect 8 July 2023.</a:t>
+              <a:t>with effect 14 July 2023.</a:t>
             </a:r>
             <a:endParaRPr b="0" lang="en-US" sz="2000" spc="-1" strike="noStrike">
               <a:solidFill>
@@ -9449,7 +9449,7 @@
                 <a:latin typeface="Times New Roman"/>
                 <a:ea typeface="Times New Roman"/>
               </a:rPr>
-              <a:t>Private Fulcrum</a:t>
+              <a:t>Private Ryan</a:t>
             </a:r>
             <a:r>
               <a:rPr b="0" lang="en-AU" sz="2000" spc="-1" strike="noStrike">
@@ -9709,7 +9709,7 @@
                 <a:latin typeface="Times New Roman"/>
                 <a:ea typeface="Times New Roman"/>
               </a:rPr>
-              <a:t>Private Fulcrum</a:t>
+              <a:t>Private Ryan</a:t>
             </a:r>
             <a:endParaRPr b="0" lang="en-US" sz="3600" spc="-1" strike="noStrike">
               <a:solidFill>
@@ -10005,7 +10005,7 @@
                 <a:latin typeface="Times New Roman"/>
                 <a:ea typeface="Times New Roman"/>
               </a:rPr>
-              <a:t>Private Fulcrum</a:t>
+              <a:t>Private Ryan</a:t>
             </a:r>
             <a:endParaRPr b="0" lang="en-US" sz="3200" spc="-1" strike="noStrike">
               <a:solidFill>
@@ -10082,7 +10082,7 @@
                 <a:latin typeface="Times New Roman"/>
                 <a:ea typeface="Times New Roman"/>
               </a:rPr>
-              <a:t>with effect 8 July 2023.</a:t>
+              <a:t>with effect 14 July 2023.</a:t>
             </a:r>
             <a:endParaRPr b="0" lang="en-US" sz="2000" spc="-1" strike="noStrike">
               <a:solidFill>
@@ -10139,7 +10139,7 @@
                 <a:latin typeface="Times New Roman"/>
                 <a:ea typeface="Times New Roman"/>
               </a:rPr>
-              <a:t>Private Fulcrum </a:t>
+              <a:t>Private Ryan </a:t>
             </a:r>
             <a:r>
               <a:rPr b="0" lang="en-AU" sz="2000" spc="-1" strike="noStrike">
@@ -10468,7 +10468,7 @@
                 <a:latin typeface="Times New Roman"/>
                 <a:ea typeface="Times New Roman"/>
               </a:rPr>
-              <a:t>Private Fulcrum</a:t>
+              <a:t>Private Ryan</a:t>
             </a:r>
             <a:endParaRPr b="0" lang="en-US" sz="3600" spc="-1" strike="noStrike">
               <a:solidFill>
@@ -10764,7 +10764,7 @@
                 <a:latin typeface="Times New Roman"/>
                 <a:ea typeface="Times New Roman"/>
               </a:rPr>
-              <a:t>Private Fulcrum</a:t>
+              <a:t>Private Ryan</a:t>
             </a:r>
             <a:endParaRPr b="0" lang="en-US" sz="3200" spc="-1" strike="noStrike">
               <a:solidFill>
@@ -10851,7 +10851,7 @@
                 <a:latin typeface="Times New Roman"/>
                 <a:ea typeface="Times New Roman"/>
               </a:rPr>
-              <a:t>8 July 2023</a:t>
+              <a:t>14 July 2023</a:t>
             </a:r>
             <a:endParaRPr b="0" lang="en-US" sz="2000" spc="-1" strike="noStrike">
               <a:solidFill>
@@ -10908,7 +10908,7 @@
                 <a:latin typeface="Times New Roman"/>
                 <a:ea typeface="Times New Roman"/>
               </a:rPr>
-              <a:t>Private Fulcrum</a:t>
+              <a:t>Private Ryan</a:t>
             </a:r>
             <a:r>
               <a:rPr b="0" lang="en-AU" sz="2000" spc="-1" strike="noStrike">
@@ -11214,7 +11214,7 @@
                 <a:latin typeface="Times New Roman"/>
                 <a:ea typeface="Times New Roman"/>
               </a:rPr>
-              <a:t>Private Fulcrum</a:t>
+              <a:t>Private Ryan</a:t>
             </a:r>
             <a:endParaRPr b="0" lang="en-US" sz="3600" spc="-1" strike="noStrike">
               <a:solidFill>
@@ -11510,7 +11510,7 @@
                 <a:latin typeface="Times New Roman"/>
                 <a:ea typeface="Times New Roman"/>
               </a:rPr>
-              <a:t>Private Fulcrum</a:t>
+              <a:t>Private Ryan</a:t>
             </a:r>
             <a:endParaRPr b="0" lang="en-US" sz="3200" spc="-1" strike="noStrike">
               <a:solidFill>
@@ -11600,7 +11600,7 @@
                 <a:latin typeface="Times New Roman"/>
                 <a:ea typeface="Times New Roman"/>
               </a:rPr>
-              <a:t>8 July 2023.</a:t>
+              <a:t>14 July 2023.</a:t>
             </a:r>
             <a:endParaRPr b="0" lang="en-US" sz="2000" spc="-1" strike="noStrike">
               <a:solidFill>
@@ -11657,7 +11657,7 @@
                 <a:latin typeface="Times New Roman"/>
                 <a:ea typeface="Times New Roman"/>
               </a:rPr>
-              <a:t>Private Fulcrum </a:t>
+              <a:t>Private Ryan </a:t>
             </a:r>
             <a:r>
               <a:rPr b="0" lang="en-AU" sz="2000" spc="-1" strike="noStrike">
@@ -11940,7 +11940,7 @@
                 <a:latin typeface="Times New Roman"/>
                 <a:ea typeface="Times New Roman"/>
               </a:rPr>
-              <a:t>Private Fulcrum</a:t>
+              <a:t>Private Ryan</a:t>
             </a:r>
             <a:endParaRPr b="0" lang="en-US" sz="3600" spc="-1" strike="noStrike">
               <a:solidFill>
@@ -12236,7 +12236,7 @@
                 <a:latin typeface="Times New Roman"/>
                 <a:ea typeface="Times New Roman"/>
               </a:rPr>
-              <a:t>Private Fulcrum</a:t>
+              <a:t>Private Ryan</a:t>
             </a:r>
             <a:endParaRPr b="0" lang="en-US" sz="3200" spc="-1" strike="noStrike">
               <a:solidFill>
@@ -12326,7 +12326,7 @@
                 <a:latin typeface="Times New Roman"/>
                 <a:ea typeface="Times New Roman"/>
               </a:rPr>
-              <a:t>8 July 2023.</a:t>
+              <a:t>14 July 2023.</a:t>
             </a:r>
             <a:endParaRPr b="0" lang="en-US" sz="2000" spc="-1" strike="noStrike">
               <a:solidFill>
@@ -12383,7 +12383,7 @@
                 <a:latin typeface="Times New Roman"/>
                 <a:ea typeface="Times New Roman"/>
               </a:rPr>
-              <a:t>Private Fulcrum </a:t>
+              <a:t>Private Ryan </a:t>
             </a:r>
             <a:r>
               <a:rPr b="0" lang="en-AU" sz="2000" spc="-1" strike="noStrike">
@@ -12666,7 +12666,7 @@
                 <a:latin typeface="Times New Roman"/>
                 <a:ea typeface="Times New Roman"/>
               </a:rPr>
-              <a:t>Private Fulcrum</a:t>
+              <a:t>Private Ryan</a:t>
             </a:r>
             <a:endParaRPr b="0" lang="en-US" sz="3600" spc="-1" strike="noStrike">
               <a:solidFill>
@@ -12962,7 +12962,7 @@
                 <a:latin typeface="Times New Roman"/>
                 <a:ea typeface="Times New Roman"/>
               </a:rPr>
-              <a:t>Private Fulcrum</a:t>
+              <a:t>Private Ryan</a:t>
             </a:r>
             <a:endParaRPr b="0" lang="en-US" sz="3200" spc="-1" strike="noStrike">
               <a:solidFill>
@@ -13052,7 +13052,7 @@
                 <a:latin typeface="Times New Roman"/>
                 <a:ea typeface="Times New Roman"/>
               </a:rPr>
-              <a:t>8 July 2023.</a:t>
+              <a:t>14 July 2023.</a:t>
             </a:r>
             <a:endParaRPr b="0" lang="en-US" sz="2000" spc="-1" strike="noStrike">
               <a:solidFill>
@@ -13109,7 +13109,7 @@
                 <a:latin typeface="Times New Roman"/>
                 <a:ea typeface="Times New Roman"/>
               </a:rPr>
-              <a:t>Private Fulcrum </a:t>
+              <a:t>Private Ryan </a:t>
             </a:r>
             <a:r>
               <a:rPr b="0" lang="en-AU" sz="2000" spc="-1" strike="noStrike">
@@ -13392,7 +13392,7 @@
                 <a:latin typeface="Times New Roman"/>
                 <a:ea typeface="Times New Roman"/>
               </a:rPr>
-              <a:t>Private Fulcrum</a:t>
+              <a:t>Private Ryan</a:t>
             </a:r>
             <a:endParaRPr b="0" lang="en-US" sz="3600" spc="-1" strike="noStrike">
               <a:solidFill>
@@ -13688,7 +13688,7 @@
                 <a:latin typeface="Times New Roman"/>
                 <a:ea typeface="Times New Roman"/>
               </a:rPr>
-              <a:t>Private Fulcrum</a:t>
+              <a:t>Private Ryan</a:t>
             </a:r>
             <a:endParaRPr b="0" lang="en-US" sz="3200" spc="-1" strike="noStrike">
               <a:solidFill>
@@ -13778,7 +13778,7 @@
                 <a:latin typeface="Times New Roman"/>
                 <a:ea typeface="Times New Roman"/>
               </a:rPr>
-              <a:t>8 July 2023.</a:t>
+              <a:t>14 July 2023.</a:t>
             </a:r>
             <a:endParaRPr b="0" lang="en-US" sz="2000" spc="-1" strike="noStrike">
               <a:solidFill>
@@ -13835,7 +13835,7 @@
                 <a:latin typeface="Times New Roman"/>
                 <a:ea typeface="Times New Roman"/>
               </a:rPr>
-              <a:t>Private Fulcrum</a:t>
+              <a:t>Private Ryan</a:t>
             </a:r>
             <a:r>
               <a:rPr b="0" i="1" lang="en-AU" sz="2000" spc="-1" strike="noStrike">

</xml_diff>